<commit_message>
Work in progress on Presentation2.pptx
</commit_message>
<xml_diff>
--- a/Presentation2.pptx
+++ b/Presentation2.pptx
@@ -4104,7 +4104,7 @@
           <a:bodyPr/>
           <a:lstStyle/>
           <a:p>
-            <a:endParaRPr lang="en-US"/>
+            <a:endParaRPr lang="en-US" dirty="0"/>
           </a:p>
         </p:txBody>
       </p:sp>
@@ -4129,7 +4129,7 @@
           <a:bodyPr/>
           <a:lstStyle/>
           <a:p>
-            <a:endParaRPr lang="en-US"/>
+            <a:endParaRPr lang="en-US" dirty="0"/>
           </a:p>
         </p:txBody>
       </p:sp>

</xml_diff>